<commit_message>
Added more detailled event and command overview
</commit_message>
<xml_diff>
--- a/SiriusCyberneticsCorp.ComplaintsDevision.pptx
+++ b/SiriusCyberneticsCorp.ComplaintsDevision.pptx
@@ -199,7 +199,7 @@
           <a:p>
             <a:fld id="{9BCC8486-670A-4C00-AE60-61D7276FEF41}" type="datetimeFigureOut">
               <a:rPr lang="de-CH" smtClean="0"/>
-              <a:t>20.09.2012</a:t>
+              <a:t>26.09.2012</a:t>
             </a:fld>
             <a:endParaRPr lang="de-CH"/>
           </a:p>
@@ -1069,7 +1069,7 @@
           <a:p>
             <a:fld id="{4CE2CE21-8E88-45A7-8312-239BEB16CE9A}" type="datetimeFigureOut">
               <a:rPr lang="de-CH" smtClean="0"/>
-              <a:t>20.09.2012</a:t>
+              <a:t>26.09.2012</a:t>
             </a:fld>
             <a:endParaRPr lang="de-CH"/>
           </a:p>
@@ -1239,7 +1239,7 @@
           <a:p>
             <a:fld id="{4CE2CE21-8E88-45A7-8312-239BEB16CE9A}" type="datetimeFigureOut">
               <a:rPr lang="de-CH" smtClean="0"/>
-              <a:t>20.09.2012</a:t>
+              <a:t>26.09.2012</a:t>
             </a:fld>
             <a:endParaRPr lang="de-CH"/>
           </a:p>
@@ -1419,7 +1419,7 @@
           <a:p>
             <a:fld id="{4CE2CE21-8E88-45A7-8312-239BEB16CE9A}" type="datetimeFigureOut">
               <a:rPr lang="de-CH" smtClean="0"/>
-              <a:t>20.09.2012</a:t>
+              <a:t>26.09.2012</a:t>
             </a:fld>
             <a:endParaRPr lang="de-CH"/>
           </a:p>
@@ -1589,7 +1589,7 @@
           <a:p>
             <a:fld id="{4CE2CE21-8E88-45A7-8312-239BEB16CE9A}" type="datetimeFigureOut">
               <a:rPr lang="de-CH" smtClean="0"/>
-              <a:t>20.09.2012</a:t>
+              <a:t>26.09.2012</a:t>
             </a:fld>
             <a:endParaRPr lang="de-CH"/>
           </a:p>
@@ -1835,7 +1835,7 @@
           <a:p>
             <a:fld id="{4CE2CE21-8E88-45A7-8312-239BEB16CE9A}" type="datetimeFigureOut">
               <a:rPr lang="de-CH" smtClean="0"/>
-              <a:t>20.09.2012</a:t>
+              <a:t>26.09.2012</a:t>
             </a:fld>
             <a:endParaRPr lang="de-CH"/>
           </a:p>
@@ -2123,7 +2123,7 @@
           <a:p>
             <a:fld id="{4CE2CE21-8E88-45A7-8312-239BEB16CE9A}" type="datetimeFigureOut">
               <a:rPr lang="de-CH" smtClean="0"/>
-              <a:t>20.09.2012</a:t>
+              <a:t>26.09.2012</a:t>
             </a:fld>
             <a:endParaRPr lang="de-CH"/>
           </a:p>
@@ -2545,7 +2545,7 @@
           <a:p>
             <a:fld id="{4CE2CE21-8E88-45A7-8312-239BEB16CE9A}" type="datetimeFigureOut">
               <a:rPr lang="de-CH" smtClean="0"/>
-              <a:t>20.09.2012</a:t>
+              <a:t>26.09.2012</a:t>
             </a:fld>
             <a:endParaRPr lang="de-CH"/>
           </a:p>
@@ -2663,7 +2663,7 @@
           <a:p>
             <a:fld id="{4CE2CE21-8E88-45A7-8312-239BEB16CE9A}" type="datetimeFigureOut">
               <a:rPr lang="de-CH" smtClean="0"/>
-              <a:t>20.09.2012</a:t>
+              <a:t>26.09.2012</a:t>
             </a:fld>
             <a:endParaRPr lang="de-CH"/>
           </a:p>
@@ -2758,7 +2758,7 @@
           <a:p>
             <a:fld id="{4CE2CE21-8E88-45A7-8312-239BEB16CE9A}" type="datetimeFigureOut">
               <a:rPr lang="de-CH" smtClean="0"/>
-              <a:t>20.09.2012</a:t>
+              <a:t>26.09.2012</a:t>
             </a:fld>
             <a:endParaRPr lang="de-CH"/>
           </a:p>
@@ -3035,7 +3035,7 @@
           <a:p>
             <a:fld id="{4CE2CE21-8E88-45A7-8312-239BEB16CE9A}" type="datetimeFigureOut">
               <a:rPr lang="de-CH" smtClean="0"/>
-              <a:t>20.09.2012</a:t>
+              <a:t>26.09.2012</a:t>
             </a:fld>
             <a:endParaRPr lang="de-CH"/>
           </a:p>
@@ -3288,7 +3288,7 @@
           <a:p>
             <a:fld id="{4CE2CE21-8E88-45A7-8312-239BEB16CE9A}" type="datetimeFigureOut">
               <a:rPr lang="de-CH" smtClean="0"/>
-              <a:t>20.09.2012</a:t>
+              <a:t>26.09.2012</a:t>
             </a:fld>
             <a:endParaRPr lang="de-CH"/>
           </a:p>
@@ -3501,7 +3501,7 @@
           <a:p>
             <a:fld id="{4CE2CE21-8E88-45A7-8312-239BEB16CE9A}" type="datetimeFigureOut">
               <a:rPr lang="de-CH" smtClean="0"/>
-              <a:t>20.09.2012</a:t>
+              <a:t>26.09.2012</a:t>
             </a:fld>
             <a:endParaRPr lang="de-CH"/>
           </a:p>
@@ -5742,6 +5742,140 @@
           </a:p>
         </p:txBody>
       </p:sp>
+      <p:cxnSp>
+        <p:nvCxnSpPr>
+          <p:cNvPr id="47" name="Straight Arrow Connector 46"/>
+          <p:cNvCxnSpPr/>
+          <p:nvPr/>
+        </p:nvCxnSpPr>
+        <p:spPr>
+          <a:xfrm>
+            <a:off x="395536" y="2105719"/>
+            <a:ext cx="864096" cy="0"/>
+          </a:xfrm>
+          <a:prstGeom prst="straightConnector1">
+            <a:avLst/>
+          </a:prstGeom>
+          <a:ln w="28575">
+            <a:solidFill>
+              <a:schemeClr val="accent2"/>
+            </a:solidFill>
+            <a:tailEnd type="arrow"/>
+          </a:ln>
+        </p:spPr>
+        <p:style>
+          <a:lnRef idx="1">
+            <a:schemeClr val="accent1"/>
+          </a:lnRef>
+          <a:fillRef idx="0">
+            <a:schemeClr val="accent1"/>
+          </a:fillRef>
+          <a:effectRef idx="0">
+            <a:schemeClr val="accent1"/>
+          </a:effectRef>
+          <a:fontRef idx="minor">
+            <a:schemeClr val="tx1"/>
+          </a:fontRef>
+        </p:style>
+      </p:cxnSp>
+      <p:sp>
+        <p:nvSpPr>
+          <p:cNvPr id="48" name="TextBox 47"/>
+          <p:cNvSpPr txBox="1"/>
+          <p:nvPr/>
+        </p:nvSpPr>
+        <p:spPr>
+          <a:xfrm>
+            <a:off x="323528" y="1756695"/>
+            <a:ext cx="805670" cy="307777"/>
+          </a:xfrm>
+          <a:prstGeom prst="rect">
+            <a:avLst/>
+          </a:prstGeom>
+          <a:noFill/>
+        </p:spPr>
+        <p:txBody>
+          <a:bodyPr wrap="none" rtlCol="0">
+            <a:spAutoFit/>
+          </a:bodyPr>
+          <a:lstStyle/>
+          <a:p>
+            <a:r>
+              <a:rPr lang="en-US" sz="1400" dirty="0" smtClean="0"/>
+              <a:t>Installed</a:t>
+            </a:r>
+            <a:endParaRPr lang="de-CH" sz="1400" dirty="0"/>
+          </a:p>
+        </p:txBody>
+      </p:sp>
+      <p:cxnSp>
+        <p:nvCxnSpPr>
+          <p:cNvPr id="50" name="Straight Arrow Connector 49"/>
+          <p:cNvCxnSpPr>
+            <a:stCxn id="38" idx="2"/>
+            <a:endCxn id="37" idx="2"/>
+          </p:cNvCxnSpPr>
+          <p:nvPr/>
+        </p:nvCxnSpPr>
+        <p:spPr>
+          <a:xfrm rot="5400000">
+            <a:off x="1928778" y="3119894"/>
+            <a:ext cx="12700" cy="618212"/>
+          </a:xfrm>
+          <a:prstGeom prst="bentConnector3">
+            <a:avLst>
+              <a:gd name="adj1" fmla="val 1800000"/>
+            </a:avLst>
+          </a:prstGeom>
+          <a:ln w="28575">
+            <a:tailEnd type="arrow"/>
+          </a:ln>
+        </p:spPr>
+        <p:style>
+          <a:lnRef idx="1">
+            <a:schemeClr val="accent1"/>
+          </a:lnRef>
+          <a:fillRef idx="0">
+            <a:schemeClr val="accent1"/>
+          </a:fillRef>
+          <a:effectRef idx="0">
+            <a:schemeClr val="accent1"/>
+          </a:effectRef>
+          <a:fontRef idx="minor">
+            <a:schemeClr val="tx1"/>
+          </a:fontRef>
+        </p:style>
+      </p:cxnSp>
+      <p:sp>
+        <p:nvSpPr>
+          <p:cNvPr id="55" name="TextBox 54"/>
+          <p:cNvSpPr txBox="1"/>
+          <p:nvPr/>
+        </p:nvSpPr>
+        <p:spPr>
+          <a:xfrm>
+            <a:off x="1239262" y="3760053"/>
+            <a:ext cx="1388522" cy="307777"/>
+          </a:xfrm>
+          <a:prstGeom prst="rect">
+            <a:avLst/>
+          </a:prstGeom>
+          <a:noFill/>
+        </p:spPr>
+        <p:txBody>
+          <a:bodyPr wrap="none" rtlCol="0">
+            <a:spAutoFit/>
+          </a:bodyPr>
+          <a:lstStyle/>
+          <a:p>
+            <a:r>
+              <a:rPr lang="en-US" sz="1400" dirty="0" smtClean="0"/>
+              <a:t>Fulfilled / Failed</a:t>
+            </a:r>
+            <a:endParaRPr lang="de-CH" dirty="0"/>
+          </a:p>
+        </p:txBody>
+      </p:sp>
     </p:spTree>
     <p:extLst>
       <p:ext uri="{BB962C8B-B14F-4D97-AF65-F5344CB8AC3E}">
@@ -7876,6 +8010,72 @@
           </a:p>
         </p:txBody>
       </p:sp>
+      <p:cxnSp>
+        <p:nvCxnSpPr>
+          <p:cNvPr id="43" name="Straight Arrow Connector 42"/>
+          <p:cNvCxnSpPr/>
+          <p:nvPr/>
+        </p:nvCxnSpPr>
+        <p:spPr>
+          <a:xfrm>
+            <a:off x="395536" y="2105719"/>
+            <a:ext cx="864096" cy="0"/>
+          </a:xfrm>
+          <a:prstGeom prst="straightConnector1">
+            <a:avLst/>
+          </a:prstGeom>
+          <a:ln w="28575">
+            <a:solidFill>
+              <a:schemeClr val="accent2"/>
+            </a:solidFill>
+            <a:tailEnd type="arrow"/>
+          </a:ln>
+        </p:spPr>
+        <p:style>
+          <a:lnRef idx="1">
+            <a:schemeClr val="accent1"/>
+          </a:lnRef>
+          <a:fillRef idx="0">
+            <a:schemeClr val="accent1"/>
+          </a:fillRef>
+          <a:effectRef idx="0">
+            <a:schemeClr val="accent1"/>
+          </a:effectRef>
+          <a:fontRef idx="minor">
+            <a:schemeClr val="tx1"/>
+          </a:fontRef>
+        </p:style>
+      </p:cxnSp>
+      <p:sp>
+        <p:nvSpPr>
+          <p:cNvPr id="44" name="TextBox 43"/>
+          <p:cNvSpPr txBox="1"/>
+          <p:nvPr/>
+        </p:nvSpPr>
+        <p:spPr>
+          <a:xfrm>
+            <a:off x="323528" y="1756695"/>
+            <a:ext cx="805670" cy="307777"/>
+          </a:xfrm>
+          <a:prstGeom prst="rect">
+            <a:avLst/>
+          </a:prstGeom>
+          <a:noFill/>
+        </p:spPr>
+        <p:txBody>
+          <a:bodyPr wrap="none" rtlCol="0">
+            <a:spAutoFit/>
+          </a:bodyPr>
+          <a:lstStyle/>
+          <a:p>
+            <a:r>
+              <a:rPr lang="en-US" sz="1400" dirty="0" smtClean="0"/>
+              <a:t>Installed</a:t>
+            </a:r>
+            <a:endParaRPr lang="de-CH" sz="1400" dirty="0"/>
+          </a:p>
+        </p:txBody>
+      </p:sp>
     </p:spTree>
     <p:extLst>
       <p:ext uri="{BB962C8B-B14F-4D97-AF65-F5344CB8AC3E}">
@@ -9385,6 +9585,137 @@
               <a:t>BecameDemotivated</a:t>
             </a:r>
             <a:endParaRPr lang="de-CH" sz="1400" dirty="0"/>
+          </a:p>
+        </p:txBody>
+      </p:sp>
+      <p:cxnSp>
+        <p:nvCxnSpPr>
+          <p:cNvPr id="47" name="Straight Arrow Connector 46"/>
+          <p:cNvCxnSpPr/>
+          <p:nvPr/>
+        </p:nvCxnSpPr>
+        <p:spPr>
+          <a:xfrm>
+            <a:off x="395536" y="2105719"/>
+            <a:ext cx="864096" cy="0"/>
+          </a:xfrm>
+          <a:prstGeom prst="straightConnector1">
+            <a:avLst/>
+          </a:prstGeom>
+          <a:ln w="28575">
+            <a:solidFill>
+              <a:schemeClr val="accent2"/>
+            </a:solidFill>
+            <a:tailEnd type="arrow"/>
+          </a:ln>
+        </p:spPr>
+        <p:style>
+          <a:lnRef idx="1">
+            <a:schemeClr val="accent1"/>
+          </a:lnRef>
+          <a:fillRef idx="0">
+            <a:schemeClr val="accent1"/>
+          </a:fillRef>
+          <a:effectRef idx="0">
+            <a:schemeClr val="accent1"/>
+          </a:effectRef>
+          <a:fontRef idx="minor">
+            <a:schemeClr val="tx1"/>
+          </a:fontRef>
+        </p:style>
+      </p:cxnSp>
+      <p:sp>
+        <p:nvSpPr>
+          <p:cNvPr id="48" name="TextBox 47"/>
+          <p:cNvSpPr txBox="1"/>
+          <p:nvPr/>
+        </p:nvSpPr>
+        <p:spPr>
+          <a:xfrm>
+            <a:off x="323528" y="1756695"/>
+            <a:ext cx="805670" cy="307777"/>
+          </a:xfrm>
+          <a:prstGeom prst="rect">
+            <a:avLst/>
+          </a:prstGeom>
+          <a:noFill/>
+        </p:spPr>
+        <p:txBody>
+          <a:bodyPr wrap="none" rtlCol="0">
+            <a:spAutoFit/>
+          </a:bodyPr>
+          <a:lstStyle/>
+          <a:p>
+            <a:r>
+              <a:rPr lang="en-US" sz="1400" dirty="0" smtClean="0"/>
+              <a:t>Installed</a:t>
+            </a:r>
+            <a:endParaRPr lang="de-CH" sz="1400" dirty="0"/>
+          </a:p>
+        </p:txBody>
+      </p:sp>
+      <p:cxnSp>
+        <p:nvCxnSpPr>
+          <p:cNvPr id="49" name="Straight Arrow Connector 49"/>
+          <p:cNvCxnSpPr/>
+          <p:nvPr/>
+        </p:nvCxnSpPr>
+        <p:spPr>
+          <a:xfrm rot="5400000">
+            <a:off x="1928778" y="3119894"/>
+            <a:ext cx="12700" cy="618212"/>
+          </a:xfrm>
+          <a:prstGeom prst="bentConnector3">
+            <a:avLst>
+              <a:gd name="adj1" fmla="val 1800000"/>
+            </a:avLst>
+          </a:prstGeom>
+          <a:ln w="28575">
+            <a:tailEnd type="arrow"/>
+          </a:ln>
+        </p:spPr>
+        <p:style>
+          <a:lnRef idx="1">
+            <a:schemeClr val="accent1"/>
+          </a:lnRef>
+          <a:fillRef idx="0">
+            <a:schemeClr val="accent1"/>
+          </a:fillRef>
+          <a:effectRef idx="0">
+            <a:schemeClr val="accent1"/>
+          </a:effectRef>
+          <a:fontRef idx="minor">
+            <a:schemeClr val="tx1"/>
+          </a:fontRef>
+        </p:style>
+      </p:cxnSp>
+      <p:sp>
+        <p:nvSpPr>
+          <p:cNvPr id="50" name="TextBox 49"/>
+          <p:cNvSpPr txBox="1"/>
+          <p:nvPr/>
+        </p:nvSpPr>
+        <p:spPr>
+          <a:xfrm>
+            <a:off x="1239262" y="3760053"/>
+            <a:ext cx="1388522" cy="307777"/>
+          </a:xfrm>
+          <a:prstGeom prst="rect">
+            <a:avLst/>
+          </a:prstGeom>
+          <a:noFill/>
+        </p:spPr>
+        <p:txBody>
+          <a:bodyPr wrap="none" rtlCol="0">
+            <a:spAutoFit/>
+          </a:bodyPr>
+          <a:lstStyle/>
+          <a:p>
+            <a:r>
+              <a:rPr lang="en-US" sz="1400" dirty="0" smtClean="0"/>
+              <a:t>Fulfilled / Failed</a:t>
+            </a:r>
+            <a:endParaRPr lang="de-CH" dirty="0"/>
           </a:p>
         </p:txBody>
       </p:sp>

</xml_diff>

<commit_message>
Added more detailled event and command overview (cherry picked from commit b98eb95e13af986cefa7b02b21ad6d720c2766dd)
</commit_message>
<xml_diff>
--- a/SiriusCyberneticsCorp.ComplaintsDevision.pptx
+++ b/SiriusCyberneticsCorp.ComplaintsDevision.pptx
@@ -199,7 +199,7 @@
           <a:p>
             <a:fld id="{9BCC8486-670A-4C00-AE60-61D7276FEF41}" type="datetimeFigureOut">
               <a:rPr lang="de-CH" smtClean="0"/>
-              <a:t>20.09.2012</a:t>
+              <a:t>26.09.2012</a:t>
             </a:fld>
             <a:endParaRPr lang="de-CH"/>
           </a:p>
@@ -1069,7 +1069,7 @@
           <a:p>
             <a:fld id="{4CE2CE21-8E88-45A7-8312-239BEB16CE9A}" type="datetimeFigureOut">
               <a:rPr lang="de-CH" smtClean="0"/>
-              <a:t>20.09.2012</a:t>
+              <a:t>26.09.2012</a:t>
             </a:fld>
             <a:endParaRPr lang="de-CH"/>
           </a:p>
@@ -1239,7 +1239,7 @@
           <a:p>
             <a:fld id="{4CE2CE21-8E88-45A7-8312-239BEB16CE9A}" type="datetimeFigureOut">
               <a:rPr lang="de-CH" smtClean="0"/>
-              <a:t>20.09.2012</a:t>
+              <a:t>26.09.2012</a:t>
             </a:fld>
             <a:endParaRPr lang="de-CH"/>
           </a:p>
@@ -1419,7 +1419,7 @@
           <a:p>
             <a:fld id="{4CE2CE21-8E88-45A7-8312-239BEB16CE9A}" type="datetimeFigureOut">
               <a:rPr lang="de-CH" smtClean="0"/>
-              <a:t>20.09.2012</a:t>
+              <a:t>26.09.2012</a:t>
             </a:fld>
             <a:endParaRPr lang="de-CH"/>
           </a:p>
@@ -1589,7 +1589,7 @@
           <a:p>
             <a:fld id="{4CE2CE21-8E88-45A7-8312-239BEB16CE9A}" type="datetimeFigureOut">
               <a:rPr lang="de-CH" smtClean="0"/>
-              <a:t>20.09.2012</a:t>
+              <a:t>26.09.2012</a:t>
             </a:fld>
             <a:endParaRPr lang="de-CH"/>
           </a:p>
@@ -1835,7 +1835,7 @@
           <a:p>
             <a:fld id="{4CE2CE21-8E88-45A7-8312-239BEB16CE9A}" type="datetimeFigureOut">
               <a:rPr lang="de-CH" smtClean="0"/>
-              <a:t>20.09.2012</a:t>
+              <a:t>26.09.2012</a:t>
             </a:fld>
             <a:endParaRPr lang="de-CH"/>
           </a:p>
@@ -2123,7 +2123,7 @@
           <a:p>
             <a:fld id="{4CE2CE21-8E88-45A7-8312-239BEB16CE9A}" type="datetimeFigureOut">
               <a:rPr lang="de-CH" smtClean="0"/>
-              <a:t>20.09.2012</a:t>
+              <a:t>26.09.2012</a:t>
             </a:fld>
             <a:endParaRPr lang="de-CH"/>
           </a:p>
@@ -2545,7 +2545,7 @@
           <a:p>
             <a:fld id="{4CE2CE21-8E88-45A7-8312-239BEB16CE9A}" type="datetimeFigureOut">
               <a:rPr lang="de-CH" smtClean="0"/>
-              <a:t>20.09.2012</a:t>
+              <a:t>26.09.2012</a:t>
             </a:fld>
             <a:endParaRPr lang="de-CH"/>
           </a:p>
@@ -2663,7 +2663,7 @@
           <a:p>
             <a:fld id="{4CE2CE21-8E88-45A7-8312-239BEB16CE9A}" type="datetimeFigureOut">
               <a:rPr lang="de-CH" smtClean="0"/>
-              <a:t>20.09.2012</a:t>
+              <a:t>26.09.2012</a:t>
             </a:fld>
             <a:endParaRPr lang="de-CH"/>
           </a:p>
@@ -2758,7 +2758,7 @@
           <a:p>
             <a:fld id="{4CE2CE21-8E88-45A7-8312-239BEB16CE9A}" type="datetimeFigureOut">
               <a:rPr lang="de-CH" smtClean="0"/>
-              <a:t>20.09.2012</a:t>
+              <a:t>26.09.2012</a:t>
             </a:fld>
             <a:endParaRPr lang="de-CH"/>
           </a:p>
@@ -3035,7 +3035,7 @@
           <a:p>
             <a:fld id="{4CE2CE21-8E88-45A7-8312-239BEB16CE9A}" type="datetimeFigureOut">
               <a:rPr lang="de-CH" smtClean="0"/>
-              <a:t>20.09.2012</a:t>
+              <a:t>26.09.2012</a:t>
             </a:fld>
             <a:endParaRPr lang="de-CH"/>
           </a:p>
@@ -3288,7 +3288,7 @@
           <a:p>
             <a:fld id="{4CE2CE21-8E88-45A7-8312-239BEB16CE9A}" type="datetimeFigureOut">
               <a:rPr lang="de-CH" smtClean="0"/>
-              <a:t>20.09.2012</a:t>
+              <a:t>26.09.2012</a:t>
             </a:fld>
             <a:endParaRPr lang="de-CH"/>
           </a:p>
@@ -3501,7 +3501,7 @@
           <a:p>
             <a:fld id="{4CE2CE21-8E88-45A7-8312-239BEB16CE9A}" type="datetimeFigureOut">
               <a:rPr lang="de-CH" smtClean="0"/>
-              <a:t>20.09.2012</a:t>
+              <a:t>26.09.2012</a:t>
             </a:fld>
             <a:endParaRPr lang="de-CH"/>
           </a:p>
@@ -5742,6 +5742,140 @@
           </a:p>
         </p:txBody>
       </p:sp>
+      <p:cxnSp>
+        <p:nvCxnSpPr>
+          <p:cNvPr id="47" name="Straight Arrow Connector 46"/>
+          <p:cNvCxnSpPr/>
+          <p:nvPr/>
+        </p:nvCxnSpPr>
+        <p:spPr>
+          <a:xfrm>
+            <a:off x="395536" y="2105719"/>
+            <a:ext cx="864096" cy="0"/>
+          </a:xfrm>
+          <a:prstGeom prst="straightConnector1">
+            <a:avLst/>
+          </a:prstGeom>
+          <a:ln w="28575">
+            <a:solidFill>
+              <a:schemeClr val="accent2"/>
+            </a:solidFill>
+            <a:tailEnd type="arrow"/>
+          </a:ln>
+        </p:spPr>
+        <p:style>
+          <a:lnRef idx="1">
+            <a:schemeClr val="accent1"/>
+          </a:lnRef>
+          <a:fillRef idx="0">
+            <a:schemeClr val="accent1"/>
+          </a:fillRef>
+          <a:effectRef idx="0">
+            <a:schemeClr val="accent1"/>
+          </a:effectRef>
+          <a:fontRef idx="minor">
+            <a:schemeClr val="tx1"/>
+          </a:fontRef>
+        </p:style>
+      </p:cxnSp>
+      <p:sp>
+        <p:nvSpPr>
+          <p:cNvPr id="48" name="TextBox 47"/>
+          <p:cNvSpPr txBox="1"/>
+          <p:nvPr/>
+        </p:nvSpPr>
+        <p:spPr>
+          <a:xfrm>
+            <a:off x="323528" y="1756695"/>
+            <a:ext cx="805670" cy="307777"/>
+          </a:xfrm>
+          <a:prstGeom prst="rect">
+            <a:avLst/>
+          </a:prstGeom>
+          <a:noFill/>
+        </p:spPr>
+        <p:txBody>
+          <a:bodyPr wrap="none" rtlCol="0">
+            <a:spAutoFit/>
+          </a:bodyPr>
+          <a:lstStyle/>
+          <a:p>
+            <a:r>
+              <a:rPr lang="en-US" sz="1400" dirty="0" smtClean="0"/>
+              <a:t>Installed</a:t>
+            </a:r>
+            <a:endParaRPr lang="de-CH" sz="1400" dirty="0"/>
+          </a:p>
+        </p:txBody>
+      </p:sp>
+      <p:cxnSp>
+        <p:nvCxnSpPr>
+          <p:cNvPr id="50" name="Straight Arrow Connector 49"/>
+          <p:cNvCxnSpPr>
+            <a:stCxn id="38" idx="2"/>
+            <a:endCxn id="37" idx="2"/>
+          </p:cNvCxnSpPr>
+          <p:nvPr/>
+        </p:nvCxnSpPr>
+        <p:spPr>
+          <a:xfrm rot="5400000">
+            <a:off x="1928778" y="3119894"/>
+            <a:ext cx="12700" cy="618212"/>
+          </a:xfrm>
+          <a:prstGeom prst="bentConnector3">
+            <a:avLst>
+              <a:gd name="adj1" fmla="val 1800000"/>
+            </a:avLst>
+          </a:prstGeom>
+          <a:ln w="28575">
+            <a:tailEnd type="arrow"/>
+          </a:ln>
+        </p:spPr>
+        <p:style>
+          <a:lnRef idx="1">
+            <a:schemeClr val="accent1"/>
+          </a:lnRef>
+          <a:fillRef idx="0">
+            <a:schemeClr val="accent1"/>
+          </a:fillRef>
+          <a:effectRef idx="0">
+            <a:schemeClr val="accent1"/>
+          </a:effectRef>
+          <a:fontRef idx="minor">
+            <a:schemeClr val="tx1"/>
+          </a:fontRef>
+        </p:style>
+      </p:cxnSp>
+      <p:sp>
+        <p:nvSpPr>
+          <p:cNvPr id="55" name="TextBox 54"/>
+          <p:cNvSpPr txBox="1"/>
+          <p:nvPr/>
+        </p:nvSpPr>
+        <p:spPr>
+          <a:xfrm>
+            <a:off x="1239262" y="3760053"/>
+            <a:ext cx="1388522" cy="307777"/>
+          </a:xfrm>
+          <a:prstGeom prst="rect">
+            <a:avLst/>
+          </a:prstGeom>
+          <a:noFill/>
+        </p:spPr>
+        <p:txBody>
+          <a:bodyPr wrap="none" rtlCol="0">
+            <a:spAutoFit/>
+          </a:bodyPr>
+          <a:lstStyle/>
+          <a:p>
+            <a:r>
+              <a:rPr lang="en-US" sz="1400" dirty="0" smtClean="0"/>
+              <a:t>Fulfilled / Failed</a:t>
+            </a:r>
+            <a:endParaRPr lang="de-CH" dirty="0"/>
+          </a:p>
+        </p:txBody>
+      </p:sp>
     </p:spTree>
     <p:extLst>
       <p:ext uri="{BB962C8B-B14F-4D97-AF65-F5344CB8AC3E}">
@@ -7876,6 +8010,72 @@
           </a:p>
         </p:txBody>
       </p:sp>
+      <p:cxnSp>
+        <p:nvCxnSpPr>
+          <p:cNvPr id="43" name="Straight Arrow Connector 42"/>
+          <p:cNvCxnSpPr/>
+          <p:nvPr/>
+        </p:nvCxnSpPr>
+        <p:spPr>
+          <a:xfrm>
+            <a:off x="395536" y="2105719"/>
+            <a:ext cx="864096" cy="0"/>
+          </a:xfrm>
+          <a:prstGeom prst="straightConnector1">
+            <a:avLst/>
+          </a:prstGeom>
+          <a:ln w="28575">
+            <a:solidFill>
+              <a:schemeClr val="accent2"/>
+            </a:solidFill>
+            <a:tailEnd type="arrow"/>
+          </a:ln>
+        </p:spPr>
+        <p:style>
+          <a:lnRef idx="1">
+            <a:schemeClr val="accent1"/>
+          </a:lnRef>
+          <a:fillRef idx="0">
+            <a:schemeClr val="accent1"/>
+          </a:fillRef>
+          <a:effectRef idx="0">
+            <a:schemeClr val="accent1"/>
+          </a:effectRef>
+          <a:fontRef idx="minor">
+            <a:schemeClr val="tx1"/>
+          </a:fontRef>
+        </p:style>
+      </p:cxnSp>
+      <p:sp>
+        <p:nvSpPr>
+          <p:cNvPr id="44" name="TextBox 43"/>
+          <p:cNvSpPr txBox="1"/>
+          <p:nvPr/>
+        </p:nvSpPr>
+        <p:spPr>
+          <a:xfrm>
+            <a:off x="323528" y="1756695"/>
+            <a:ext cx="805670" cy="307777"/>
+          </a:xfrm>
+          <a:prstGeom prst="rect">
+            <a:avLst/>
+          </a:prstGeom>
+          <a:noFill/>
+        </p:spPr>
+        <p:txBody>
+          <a:bodyPr wrap="none" rtlCol="0">
+            <a:spAutoFit/>
+          </a:bodyPr>
+          <a:lstStyle/>
+          <a:p>
+            <a:r>
+              <a:rPr lang="en-US" sz="1400" dirty="0" smtClean="0"/>
+              <a:t>Installed</a:t>
+            </a:r>
+            <a:endParaRPr lang="de-CH" sz="1400" dirty="0"/>
+          </a:p>
+        </p:txBody>
+      </p:sp>
     </p:spTree>
     <p:extLst>
       <p:ext uri="{BB962C8B-B14F-4D97-AF65-F5344CB8AC3E}">
@@ -9385,6 +9585,137 @@
               <a:t>BecameDemotivated</a:t>
             </a:r>
             <a:endParaRPr lang="de-CH" sz="1400" dirty="0"/>
+          </a:p>
+        </p:txBody>
+      </p:sp>
+      <p:cxnSp>
+        <p:nvCxnSpPr>
+          <p:cNvPr id="47" name="Straight Arrow Connector 46"/>
+          <p:cNvCxnSpPr/>
+          <p:nvPr/>
+        </p:nvCxnSpPr>
+        <p:spPr>
+          <a:xfrm>
+            <a:off x="395536" y="2105719"/>
+            <a:ext cx="864096" cy="0"/>
+          </a:xfrm>
+          <a:prstGeom prst="straightConnector1">
+            <a:avLst/>
+          </a:prstGeom>
+          <a:ln w="28575">
+            <a:solidFill>
+              <a:schemeClr val="accent2"/>
+            </a:solidFill>
+            <a:tailEnd type="arrow"/>
+          </a:ln>
+        </p:spPr>
+        <p:style>
+          <a:lnRef idx="1">
+            <a:schemeClr val="accent1"/>
+          </a:lnRef>
+          <a:fillRef idx="0">
+            <a:schemeClr val="accent1"/>
+          </a:fillRef>
+          <a:effectRef idx="0">
+            <a:schemeClr val="accent1"/>
+          </a:effectRef>
+          <a:fontRef idx="minor">
+            <a:schemeClr val="tx1"/>
+          </a:fontRef>
+        </p:style>
+      </p:cxnSp>
+      <p:sp>
+        <p:nvSpPr>
+          <p:cNvPr id="48" name="TextBox 47"/>
+          <p:cNvSpPr txBox="1"/>
+          <p:nvPr/>
+        </p:nvSpPr>
+        <p:spPr>
+          <a:xfrm>
+            <a:off x="323528" y="1756695"/>
+            <a:ext cx="805670" cy="307777"/>
+          </a:xfrm>
+          <a:prstGeom prst="rect">
+            <a:avLst/>
+          </a:prstGeom>
+          <a:noFill/>
+        </p:spPr>
+        <p:txBody>
+          <a:bodyPr wrap="none" rtlCol="0">
+            <a:spAutoFit/>
+          </a:bodyPr>
+          <a:lstStyle/>
+          <a:p>
+            <a:r>
+              <a:rPr lang="en-US" sz="1400" dirty="0" smtClean="0"/>
+              <a:t>Installed</a:t>
+            </a:r>
+            <a:endParaRPr lang="de-CH" sz="1400" dirty="0"/>
+          </a:p>
+        </p:txBody>
+      </p:sp>
+      <p:cxnSp>
+        <p:nvCxnSpPr>
+          <p:cNvPr id="49" name="Straight Arrow Connector 49"/>
+          <p:cNvCxnSpPr/>
+          <p:nvPr/>
+        </p:nvCxnSpPr>
+        <p:spPr>
+          <a:xfrm rot="5400000">
+            <a:off x="1928778" y="3119894"/>
+            <a:ext cx="12700" cy="618212"/>
+          </a:xfrm>
+          <a:prstGeom prst="bentConnector3">
+            <a:avLst>
+              <a:gd name="adj1" fmla="val 1800000"/>
+            </a:avLst>
+          </a:prstGeom>
+          <a:ln w="28575">
+            <a:tailEnd type="arrow"/>
+          </a:ln>
+        </p:spPr>
+        <p:style>
+          <a:lnRef idx="1">
+            <a:schemeClr val="accent1"/>
+          </a:lnRef>
+          <a:fillRef idx="0">
+            <a:schemeClr val="accent1"/>
+          </a:fillRef>
+          <a:effectRef idx="0">
+            <a:schemeClr val="accent1"/>
+          </a:effectRef>
+          <a:fontRef idx="minor">
+            <a:schemeClr val="tx1"/>
+          </a:fontRef>
+        </p:style>
+      </p:cxnSp>
+      <p:sp>
+        <p:nvSpPr>
+          <p:cNvPr id="50" name="TextBox 49"/>
+          <p:cNvSpPr txBox="1"/>
+          <p:nvPr/>
+        </p:nvSpPr>
+        <p:spPr>
+          <a:xfrm>
+            <a:off x="1239262" y="3760053"/>
+            <a:ext cx="1388522" cy="307777"/>
+          </a:xfrm>
+          <a:prstGeom prst="rect">
+            <a:avLst/>
+          </a:prstGeom>
+          <a:noFill/>
+        </p:spPr>
+        <p:txBody>
+          <a:bodyPr wrap="none" rtlCol="0">
+            <a:spAutoFit/>
+          </a:bodyPr>
+          <a:lstStyle/>
+          <a:p>
+            <a:r>
+              <a:rPr lang="en-US" sz="1400" dirty="0" smtClean="0"/>
+              <a:t>Fulfilled / Failed</a:t>
+            </a:r>
+            <a:endParaRPr lang="de-CH" dirty="0"/>
           </a:p>
         </p:txBody>
       </p:sp>

</xml_diff>

<commit_message>
Updated slides with delayed mode
</commit_message>
<xml_diff>
--- a/SiriusCyberneticsCorp.ComplaintsDevision.pptx
+++ b/SiriusCyberneticsCorp.ComplaintsDevision.pptx
@@ -114,6 +114,22 @@
       </a:defRPr>
     </a:lvl9pPr>
   </p:defaultTextStyle>
+  <p:extLst>
+    <p:ext uri="{EFAFB233-063F-42B5-8137-9DF3F51BA10A}">
+      <p15:sldGuideLst xmlns:p15="http://schemas.microsoft.com/office/powerpoint/2012/main">
+        <p15:guide id="1" orient="horz" pos="2160">
+          <p15:clr>
+            <a:srgbClr val="A4A3A4"/>
+          </p15:clr>
+        </p15:guide>
+        <p15:guide id="2" pos="2880">
+          <p15:clr>
+            <a:srgbClr val="A4A3A4"/>
+          </p15:clr>
+        </p15:guide>
+      </p15:sldGuideLst>
+    </p:ext>
+  </p:extLst>
 </p:presentation>
 </file>
 
@@ -199,7 +215,7 @@
           <a:p>
             <a:fld id="{9BCC8486-670A-4C00-AE60-61D7276FEF41}" type="datetimeFigureOut">
               <a:rPr lang="de-CH" smtClean="0"/>
-              <a:t>26.09.2012</a:t>
+              <a:t>16.10.2013</a:t>
             </a:fld>
             <a:endParaRPr lang="de-CH"/>
           </a:p>
@@ -1069,7 +1085,7 @@
           <a:p>
             <a:fld id="{4CE2CE21-8E88-45A7-8312-239BEB16CE9A}" type="datetimeFigureOut">
               <a:rPr lang="de-CH" smtClean="0"/>
-              <a:t>26.09.2012</a:t>
+              <a:t>16.10.2013</a:t>
             </a:fld>
             <a:endParaRPr lang="de-CH"/>
           </a:p>
@@ -1239,7 +1255,7 @@
           <a:p>
             <a:fld id="{4CE2CE21-8E88-45A7-8312-239BEB16CE9A}" type="datetimeFigureOut">
               <a:rPr lang="de-CH" smtClean="0"/>
-              <a:t>26.09.2012</a:t>
+              <a:t>16.10.2013</a:t>
             </a:fld>
             <a:endParaRPr lang="de-CH"/>
           </a:p>
@@ -1419,7 +1435,7 @@
           <a:p>
             <a:fld id="{4CE2CE21-8E88-45A7-8312-239BEB16CE9A}" type="datetimeFigureOut">
               <a:rPr lang="de-CH" smtClean="0"/>
-              <a:t>26.09.2012</a:t>
+              <a:t>16.10.2013</a:t>
             </a:fld>
             <a:endParaRPr lang="de-CH"/>
           </a:p>
@@ -1589,7 +1605,7 @@
           <a:p>
             <a:fld id="{4CE2CE21-8E88-45A7-8312-239BEB16CE9A}" type="datetimeFigureOut">
               <a:rPr lang="de-CH" smtClean="0"/>
-              <a:t>26.09.2012</a:t>
+              <a:t>16.10.2013</a:t>
             </a:fld>
             <a:endParaRPr lang="de-CH"/>
           </a:p>
@@ -1835,7 +1851,7 @@
           <a:p>
             <a:fld id="{4CE2CE21-8E88-45A7-8312-239BEB16CE9A}" type="datetimeFigureOut">
               <a:rPr lang="de-CH" smtClean="0"/>
-              <a:t>26.09.2012</a:t>
+              <a:t>16.10.2013</a:t>
             </a:fld>
             <a:endParaRPr lang="de-CH"/>
           </a:p>
@@ -2123,7 +2139,7 @@
           <a:p>
             <a:fld id="{4CE2CE21-8E88-45A7-8312-239BEB16CE9A}" type="datetimeFigureOut">
               <a:rPr lang="de-CH" smtClean="0"/>
-              <a:t>26.09.2012</a:t>
+              <a:t>16.10.2013</a:t>
             </a:fld>
             <a:endParaRPr lang="de-CH"/>
           </a:p>
@@ -2545,7 +2561,7 @@
           <a:p>
             <a:fld id="{4CE2CE21-8E88-45A7-8312-239BEB16CE9A}" type="datetimeFigureOut">
               <a:rPr lang="de-CH" smtClean="0"/>
-              <a:t>26.09.2012</a:t>
+              <a:t>16.10.2013</a:t>
             </a:fld>
             <a:endParaRPr lang="de-CH"/>
           </a:p>
@@ -2663,7 +2679,7 @@
           <a:p>
             <a:fld id="{4CE2CE21-8E88-45A7-8312-239BEB16CE9A}" type="datetimeFigureOut">
               <a:rPr lang="de-CH" smtClean="0"/>
-              <a:t>26.09.2012</a:t>
+              <a:t>16.10.2013</a:t>
             </a:fld>
             <a:endParaRPr lang="de-CH"/>
           </a:p>
@@ -2758,7 +2774,7 @@
           <a:p>
             <a:fld id="{4CE2CE21-8E88-45A7-8312-239BEB16CE9A}" type="datetimeFigureOut">
               <a:rPr lang="de-CH" smtClean="0"/>
-              <a:t>26.09.2012</a:t>
+              <a:t>16.10.2013</a:t>
             </a:fld>
             <a:endParaRPr lang="de-CH"/>
           </a:p>
@@ -3035,7 +3051,7 @@
           <a:p>
             <a:fld id="{4CE2CE21-8E88-45A7-8312-239BEB16CE9A}" type="datetimeFigureOut">
               <a:rPr lang="de-CH" smtClean="0"/>
-              <a:t>26.09.2012</a:t>
+              <a:t>16.10.2013</a:t>
             </a:fld>
             <a:endParaRPr lang="de-CH"/>
           </a:p>
@@ -3288,7 +3304,7 @@
           <a:p>
             <a:fld id="{4CE2CE21-8E88-45A7-8312-239BEB16CE9A}" type="datetimeFigureOut">
               <a:rPr lang="de-CH" smtClean="0"/>
-              <a:t>26.09.2012</a:t>
+              <a:t>16.10.2013</a:t>
             </a:fld>
             <a:endParaRPr lang="de-CH"/>
           </a:p>
@@ -3501,7 +3517,7 @@
           <a:p>
             <a:fld id="{4CE2CE21-8E88-45A7-8312-239BEB16CE9A}" type="datetimeFigureOut">
               <a:rPr lang="de-CH" smtClean="0"/>
-              <a:t>26.09.2012</a:t>
+              <a:t>16.10.2013</a:t>
             </a:fld>
             <a:endParaRPr lang="de-CH"/>
           </a:p>
@@ -5855,7 +5871,7 @@
         <p:spPr>
           <a:xfrm>
             <a:off x="1239262" y="3760053"/>
-            <a:ext cx="1388522" cy="307777"/>
+            <a:ext cx="1504836" cy="307777"/>
           </a:xfrm>
           <a:prstGeom prst="rect">
             <a:avLst/>
@@ -5870,7 +5886,11 @@
           <a:p>
             <a:r>
               <a:rPr lang="en-US" sz="1400" dirty="0" smtClean="0"/>
-              <a:t>Fulfilled / Failed</a:t>
+              <a:t>Fulfilled / </a:t>
+            </a:r>
+            <a:r>
+              <a:rPr lang="en-US" sz="1400" dirty="0" smtClean="0"/>
+              <a:t>Delayed</a:t>
             </a:r>
             <a:endParaRPr lang="de-CH" dirty="0"/>
           </a:p>
@@ -9698,7 +9718,7 @@
         <p:spPr>
           <a:xfrm>
             <a:off x="1239262" y="3760053"/>
-            <a:ext cx="1388522" cy="307777"/>
+            <a:ext cx="1504836" cy="307777"/>
           </a:xfrm>
           <a:prstGeom prst="rect">
             <a:avLst/>
@@ -9713,7 +9733,11 @@
           <a:p>
             <a:r>
               <a:rPr lang="en-US" sz="1400" dirty="0" smtClean="0"/>
-              <a:t>Fulfilled / Failed</a:t>
+              <a:t>Fulfilled / </a:t>
+            </a:r>
+            <a:r>
+              <a:rPr lang="en-US" sz="1400" dirty="0" smtClean="0"/>
+              <a:t>Delayed</a:t>
             </a:r>
             <a:endParaRPr lang="de-CH" dirty="0"/>
           </a:p>

</xml_diff>